<commit_message>
Added IEnumerable<T> example and slide for it.
</commit_message>
<xml_diff>
--- a/Lambdas.pptx
+++ b/Lambdas.pptx
@@ -12,10 +12,10 @@
     <p:sldMasterId id="2147483722" r:id="rId8"/>
   </p:sldMasterIdLst>
   <p:notesMasterIdLst>
-    <p:notesMasterId r:id="rId15"/>
+    <p:notesMasterId r:id="rId16"/>
   </p:notesMasterIdLst>
   <p:handoutMasterIdLst>
-    <p:handoutMasterId r:id="rId16"/>
+    <p:handoutMasterId r:id="rId17"/>
   </p:handoutMasterIdLst>
   <p:sldIdLst>
     <p:sldId id="1633" r:id="rId9"/>
@@ -23,7 +23,8 @@
     <p:sldId id="1634" r:id="rId11"/>
     <p:sldId id="1636" r:id="rId12"/>
     <p:sldId id="1637" r:id="rId13"/>
-    <p:sldId id="1638" r:id="rId14"/>
+    <p:sldId id="1639" r:id="rId14"/>
+    <p:sldId id="1638" r:id="rId15"/>
   </p:sldIdLst>
   <p:sldSz cx="12192000" cy="6858000"/>
   <p:notesSz cx="6858000" cy="9144000"/>
@@ -238,7 +239,7 @@
           <a:p>
             <a:fld id="{E50B6D09-2D83-3743-A489-D681760BB3C1}" type="datetimeFigureOut">
               <a:rPr lang="en-US" smtClean="0"/>
-              <a:t>10/17/2019</a:t>
+              <a:t>10/23/19</a:t>
             </a:fld>
             <a:endParaRPr lang="en-US"/>
           </a:p>
@@ -415,7 +416,7 @@
           <a:p>
             <a:fld id="{CC262F09-6412-C146-9CE3-2A39CB992E48}" type="datetimeFigureOut">
               <a:rPr lang="en-US" smtClean="0"/>
-              <a:t>10/17/2019</a:t>
+              <a:t>10/23/19</a:t>
             </a:fld>
             <a:endParaRPr lang="en-US"/>
           </a:p>
@@ -28129,6 +28130,201 @@
 </file>
 
 <file path=ppt/slides/slide6.xml><?xml version="1.0" encoding="utf-8"?>
+<p:sld xmlns:a="http://schemas.openxmlformats.org/drawingml/2006/main" xmlns:r="http://schemas.openxmlformats.org/officeDocument/2006/relationships" xmlns:p="http://schemas.openxmlformats.org/presentationml/2006/main">
+  <p:cSld>
+    <p:spTree>
+      <p:nvGrpSpPr>
+        <p:cNvPr id="1" name=""/>
+        <p:cNvGrpSpPr/>
+        <p:nvPr/>
+      </p:nvGrpSpPr>
+      <p:grpSpPr>
+        <a:xfrm>
+          <a:off x="0" y="0"/>
+          <a:ext cx="0" cy="0"/>
+          <a:chOff x="0" y="0"/>
+          <a:chExt cx="0" cy="0"/>
+        </a:xfrm>
+      </p:grpSpPr>
+      <p:sp>
+        <p:nvSpPr>
+          <p:cNvPr id="5" name="Text Placeholder 4">
+            <a:extLst>
+              <a:ext uri="{FF2B5EF4-FFF2-40B4-BE49-F238E27FC236}">
+                <a16:creationId xmlns:a16="http://schemas.microsoft.com/office/drawing/2014/main" id="{AA409E5D-133A-4833-8E82-FE7FA126CC4E}"/>
+              </a:ext>
+            </a:extLst>
+          </p:cNvPr>
+          <p:cNvSpPr>
+            <a:spLocks noGrp="1"/>
+          </p:cNvSpPr>
+          <p:nvPr>
+            <p:ph type="body" sz="quarter" idx="18"/>
+          </p:nvPr>
+        </p:nvSpPr>
+        <p:spPr>
+          <a:xfrm>
+            <a:off x="667512" y="301754"/>
+            <a:ext cx="10506456" cy="347018"/>
+          </a:xfrm>
+        </p:spPr>
+        <p:txBody>
+          <a:bodyPr/>
+          <a:lstStyle/>
+          <a:p>
+            <a:r>
+              <a:rPr lang="en-US" dirty="0"/>
+              <a:t>Lazy Evaluation</a:t>
+            </a:r>
+          </a:p>
+        </p:txBody>
+      </p:sp>
+      <p:sp>
+        <p:nvSpPr>
+          <p:cNvPr id="6" name="Text Placeholder 5">
+            <a:extLst>
+              <a:ext uri="{FF2B5EF4-FFF2-40B4-BE49-F238E27FC236}">
+                <a16:creationId xmlns:a16="http://schemas.microsoft.com/office/drawing/2014/main" id="{046DBE41-D46F-4C83-BD14-8A71E1007835}"/>
+              </a:ext>
+            </a:extLst>
+          </p:cNvPr>
+          <p:cNvSpPr>
+            <a:spLocks noGrp="1"/>
+          </p:cNvSpPr>
+          <p:nvPr>
+            <p:ph type="body" sz="quarter" idx="19"/>
+          </p:nvPr>
+        </p:nvSpPr>
+        <p:spPr>
+          <a:xfrm>
+            <a:off x="667512" y="1049619"/>
+            <a:ext cx="11011033" cy="4990962"/>
+          </a:xfrm>
+        </p:spPr>
+        <p:txBody>
+          <a:bodyPr/>
+          <a:lstStyle/>
+          <a:p>
+            <a:pPr marL="342900" indent="-342900">
+              <a:lnSpc>
+                <a:spcPct val="100000"/>
+              </a:lnSpc>
+              <a:spcBef>
+                <a:spcPts val="1000"/>
+              </a:spcBef>
+              <a:buFont typeface="Arial" panose="020B0604020202020204" pitchFamily="34" charset="0"/>
+              <a:buChar char="•"/>
+            </a:pPr>
+            <a:r>
+              <a:rPr lang="en-US" sz="2000" dirty="0"/>
+              <a:t>LINQ Expressions are expressions and not instructions.</a:t>
+            </a:r>
+          </a:p>
+          <a:p>
+            <a:pPr marL="342900" indent="-342900">
+              <a:lnSpc>
+                <a:spcPct val="100000"/>
+              </a:lnSpc>
+              <a:spcBef>
+                <a:spcPts val="1000"/>
+              </a:spcBef>
+              <a:buFont typeface="Arial" panose="020B0604020202020204" pitchFamily="34" charset="0"/>
+              <a:buChar char="•"/>
+            </a:pPr>
+            <a:r>
+              <a:rPr lang="en-US" sz="2000" dirty="0"/>
+              <a:t>They are evaluated only when there is a need</a:t>
+            </a:r>
+          </a:p>
+          <a:p>
+            <a:pPr marL="342900" indent="-342900">
+              <a:lnSpc>
+                <a:spcPct val="100000"/>
+              </a:lnSpc>
+              <a:spcBef>
+                <a:spcPts val="1000"/>
+              </a:spcBef>
+              <a:buFont typeface="Arial" panose="020B0604020202020204" pitchFamily="34" charset="0"/>
+              <a:buChar char="•"/>
+            </a:pPr>
+            <a:r>
+              <a:rPr lang="en-US" sz="2000" dirty="0" err="1"/>
+              <a:t>IEnumerable</a:t>
+            </a:r>
+            <a:r>
+              <a:rPr lang="en-US" sz="2000" dirty="0"/>
+              <a:t>&lt;T&gt; and yield return</a:t>
+            </a:r>
+          </a:p>
+          <a:p>
+            <a:pPr marL="342900" indent="-342900">
+              <a:lnSpc>
+                <a:spcPct val="100000"/>
+              </a:lnSpc>
+              <a:spcBef>
+                <a:spcPts val="1000"/>
+              </a:spcBef>
+              <a:buFont typeface="Arial" panose="020B0604020202020204" pitchFamily="34" charset="0"/>
+              <a:buChar char="•"/>
+            </a:pPr>
+            <a:r>
+              <a:rPr lang="en-US" sz="2000" dirty="0"/>
+              <a:t>Play around with what expressions evaluate and what don’t.</a:t>
+            </a:r>
+          </a:p>
+          <a:p>
+            <a:pPr marL="342900" indent="-342900">
+              <a:lnSpc>
+                <a:spcPct val="100000"/>
+              </a:lnSpc>
+              <a:spcBef>
+                <a:spcPts val="1000"/>
+              </a:spcBef>
+              <a:buFont typeface="Arial" panose="020B0604020202020204" pitchFamily="34" charset="0"/>
+              <a:buChar char="•"/>
+            </a:pPr>
+            <a:r>
+              <a:rPr lang="en-US" sz="2000" dirty="0"/>
+              <a:t>Make it eager by calling </a:t>
+            </a:r>
+            <a:r>
+              <a:rPr lang="en-US" sz="2000" dirty="0" err="1"/>
+              <a:t>ToList</a:t>
+            </a:r>
+            <a:r>
+              <a:rPr lang="en-US" sz="2000"/>
+              <a:t>().</a:t>
+            </a:r>
+            <a:endParaRPr lang="en-US" sz="2000" dirty="0"/>
+          </a:p>
+        </p:txBody>
+      </p:sp>
+    </p:spTree>
+    <p:extLst>
+      <p:ext uri="{BB962C8B-B14F-4D97-AF65-F5344CB8AC3E}">
+        <p14:creationId xmlns:p14="http://schemas.microsoft.com/office/powerpoint/2010/main" val="530379474"/>
+      </p:ext>
+    </p:extLst>
+  </p:cSld>
+  <p:clrMapOvr>
+    <a:masterClrMapping/>
+  </p:clrMapOvr>
+  <mc:AlternateContent xmlns:mc="http://schemas.openxmlformats.org/markup-compatibility/2006" xmlns:p14="http://schemas.microsoft.com/office/powerpoint/2010/main">
+    <mc:Choice Requires="p14">
+      <p:transition spd="med" p14:dur="700">
+        <p:fade/>
+      </p:transition>
+    </mc:Choice>
+    <mc:Fallback xmlns="">
+      <p:transition spd="med">
+        <p:fade/>
+      </p:transition>
+    </mc:Fallback>
+  </mc:AlternateContent>
+</p:sld>
+</file>
+
+<file path=ppt/slides/slide7.xml><?xml version="1.0" encoding="utf-8"?>
 <p:sld xmlns:a="http://schemas.openxmlformats.org/drawingml/2006/main" xmlns:r="http://schemas.openxmlformats.org/officeDocument/2006/relationships" xmlns:p="http://schemas.openxmlformats.org/presentationml/2006/main">
   <p:cSld>
     <p:spTree>

</xml_diff>